<commit_message>
commit de la victoire
</commit_message>
<xml_diff>
--- a/soutenances/projet_decembre/planif_et_conclu.pptx
+++ b/soutenances/projet_decembre/planif_et_conclu.pptx
@@ -112,7 +112,7 @@
   </p:defaultTextStyle>
   <p:extLst>
     <p:ext uri="{521415D9-36F7-43E2-AB2F-B90AF26B5E84}">
-      <p14:sectionLst xmlns:p14="http://schemas.microsoft.com/office/powerpoint/2010/main" xmlns="">
+      <p14:sectionLst xmlns="" xmlns:p14="http://schemas.microsoft.com/office/powerpoint/2010/main">
         <p14:section name="Modèles INSA" id="{339B715A-A4F6-482F-9E8F-E995A152AF53}">
           <p14:sldIdLst>
             <p14:sldId id="256"/>
@@ -213,7 +213,7 @@
             <a:blip r:embed="rId2" cstate="print">
               <a:extLst>
                 <a:ext uri="{28A0092B-C50C-407E-A947-70E740481C1C}">
-                  <a14:useLocalDpi xmlns:a14="http://schemas.microsoft.com/office/drawing/2010/main" xmlns="" val="0"/>
+                  <a14:useLocalDpi xmlns="" xmlns:a14="http://schemas.microsoft.com/office/drawing/2010/main" val="0"/>
                 </a:ext>
               </a:extLst>
             </a:blip>
@@ -231,7 +231,7 @@
             <a:noFill/>
             <a:extLst>
               <a:ext uri="{909E8E84-426E-40DD-AFC4-6F175D3DCCD1}">
-                <a14:hiddenFill xmlns:a14="http://schemas.microsoft.com/office/drawing/2010/main" xmlns="">
+                <a14:hiddenFill xmlns="" xmlns:a14="http://schemas.microsoft.com/office/drawing/2010/main">
                   <a:solidFill>
                     <a:srgbClr val="FFFFFF"/>
                   </a:solidFill>
@@ -252,7 +252,7 @@
             <a:blip r:embed="rId3" cstate="print">
               <a:extLst>
                 <a:ext uri="{28A0092B-C50C-407E-A947-70E740481C1C}">
-                  <a14:useLocalDpi xmlns:a14="http://schemas.microsoft.com/office/drawing/2010/main" xmlns="" val="0"/>
+                  <a14:useLocalDpi xmlns="" xmlns:a14="http://schemas.microsoft.com/office/drawing/2010/main" val="0"/>
                 </a:ext>
               </a:extLst>
             </a:blip>
@@ -272,7 +272,7 @@
             <a:noFill/>
             <a:extLst>
               <a:ext uri="{909E8E84-426E-40DD-AFC4-6F175D3DCCD1}">
-                <a14:hiddenFill xmlns:a14="http://schemas.microsoft.com/office/drawing/2010/main" xmlns="">
+                <a14:hiddenFill xmlns="" xmlns:a14="http://schemas.microsoft.com/office/drawing/2010/main">
                   <a:solidFill>
                     <a:srgbClr val="FFFFFF"/>
                   </a:solidFill>
@@ -1321,7 +1321,7 @@
     </p:spTree>
     <p:extLst>
       <p:ext uri="{BB962C8B-B14F-4D97-AF65-F5344CB8AC3E}">
-        <p14:creationId xmlns:p14="http://schemas.microsoft.com/office/powerpoint/2010/main" xmlns="" val="2155599893"/>
+        <p14:creationId xmlns="" xmlns:p14="http://schemas.microsoft.com/office/powerpoint/2010/main" val="2155599893"/>
       </p:ext>
     </p:extLst>
   </p:cSld>
@@ -1479,7 +1479,7 @@
     </p:spTree>
     <p:extLst>
       <p:ext uri="{BB962C8B-B14F-4D97-AF65-F5344CB8AC3E}">
-        <p14:creationId xmlns:p14="http://schemas.microsoft.com/office/powerpoint/2010/main" xmlns="" val="2625538701"/>
+        <p14:creationId xmlns="" xmlns:p14="http://schemas.microsoft.com/office/powerpoint/2010/main" val="2625538701"/>
       </p:ext>
     </p:extLst>
   </p:cSld>
@@ -1707,7 +1707,7 @@
     </p:spTree>
     <p:extLst>
       <p:ext uri="{BB962C8B-B14F-4D97-AF65-F5344CB8AC3E}">
-        <p14:creationId xmlns:p14="http://schemas.microsoft.com/office/powerpoint/2010/main" xmlns="" val="1505370761"/>
+        <p14:creationId xmlns="" xmlns:p14="http://schemas.microsoft.com/office/powerpoint/2010/main" val="1505370761"/>
       </p:ext>
     </p:extLst>
   </p:cSld>
@@ -1953,7 +1953,7 @@
     </p:spTree>
     <p:extLst>
       <p:ext uri="{BB962C8B-B14F-4D97-AF65-F5344CB8AC3E}">
-        <p14:creationId xmlns:p14="http://schemas.microsoft.com/office/powerpoint/2010/main" xmlns="" val="1601618539"/>
+        <p14:creationId xmlns="" xmlns:p14="http://schemas.microsoft.com/office/powerpoint/2010/main" val="1601618539"/>
       </p:ext>
     </p:extLst>
   </p:cSld>
@@ -2337,7 +2337,7 @@
     </p:spTree>
     <p:extLst>
       <p:ext uri="{BB962C8B-B14F-4D97-AF65-F5344CB8AC3E}">
-        <p14:creationId xmlns:p14="http://schemas.microsoft.com/office/powerpoint/2010/main" xmlns="" val="171255179"/>
+        <p14:creationId xmlns="" xmlns:p14="http://schemas.microsoft.com/office/powerpoint/2010/main" val="171255179"/>
       </p:ext>
     </p:extLst>
   </p:cSld>
@@ -2439,7 +2439,7 @@
     </p:spTree>
     <p:extLst>
       <p:ext uri="{BB962C8B-B14F-4D97-AF65-F5344CB8AC3E}">
-        <p14:creationId xmlns:p14="http://schemas.microsoft.com/office/powerpoint/2010/main" xmlns="" val="4241946124"/>
+        <p14:creationId xmlns="" xmlns:p14="http://schemas.microsoft.com/office/powerpoint/2010/main" val="4241946124"/>
       </p:ext>
     </p:extLst>
   </p:cSld>
@@ -2477,7 +2477,7 @@
     </p:spTree>
     <p:extLst>
       <p:ext uri="{BB962C8B-B14F-4D97-AF65-F5344CB8AC3E}">
-        <p14:creationId xmlns:p14="http://schemas.microsoft.com/office/powerpoint/2010/main" xmlns="" val="3843733788"/>
+        <p14:creationId xmlns="" xmlns:p14="http://schemas.microsoft.com/office/powerpoint/2010/main" val="3843733788"/>
       </p:ext>
     </p:extLst>
   </p:cSld>
@@ -2773,7 +2773,7 @@
     </p:spTree>
     <p:extLst>
       <p:ext uri="{BB962C8B-B14F-4D97-AF65-F5344CB8AC3E}">
-        <p14:creationId xmlns:p14="http://schemas.microsoft.com/office/powerpoint/2010/main" xmlns="" val="680884878"/>
+        <p14:creationId xmlns="" xmlns:p14="http://schemas.microsoft.com/office/powerpoint/2010/main" val="680884878"/>
       </p:ext>
     </p:extLst>
   </p:cSld>
@@ -3822,7 +3822,7 @@
           <a:blip r:embed="rId10" cstate="print">
             <a:extLst>
               <a:ext uri="{28A0092B-C50C-407E-A947-70E740481C1C}">
-                <a14:useLocalDpi xmlns:a14="http://schemas.microsoft.com/office/drawing/2010/main" xmlns="" val="0"/>
+                <a14:useLocalDpi xmlns="" xmlns:a14="http://schemas.microsoft.com/office/drawing/2010/main" val="0"/>
               </a:ext>
             </a:extLst>
           </a:blip>
@@ -3840,7 +3840,7 @@
           <a:noFill/>
           <a:extLst>
             <a:ext uri="{909E8E84-426E-40DD-AFC4-6F175D3DCCD1}">
-              <a14:hiddenFill xmlns:a14="http://schemas.microsoft.com/office/drawing/2010/main" xmlns="">
+              <a14:hiddenFill xmlns="" xmlns:a14="http://schemas.microsoft.com/office/drawing/2010/main">
                 <a:solidFill>
                   <a:srgbClr val="FFFFFF"/>
                 </a:solidFill>
@@ -3861,7 +3861,7 @@
           <a:blip r:embed="rId11" cstate="print">
             <a:extLst>
               <a:ext uri="{28A0092B-C50C-407E-A947-70E740481C1C}">
-                <a14:useLocalDpi xmlns:a14="http://schemas.microsoft.com/office/drawing/2010/main" xmlns="" val="0"/>
+                <a14:useLocalDpi xmlns="" xmlns:a14="http://schemas.microsoft.com/office/drawing/2010/main" val="0"/>
               </a:ext>
             </a:extLst>
           </a:blip>
@@ -3881,7 +3881,7 @@
           <a:noFill/>
           <a:extLst>
             <a:ext uri="{909E8E84-426E-40DD-AFC4-6F175D3DCCD1}">
-              <a14:hiddenFill xmlns:a14="http://schemas.microsoft.com/office/drawing/2010/main" xmlns="">
+              <a14:hiddenFill xmlns="" xmlns:a14="http://schemas.microsoft.com/office/drawing/2010/main">
                 <a:solidFill>
                   <a:srgbClr val="FFFFFF"/>
                 </a:solidFill>
@@ -4039,7 +4039,7 @@
             <a:lum bright="70000" contrast="-70000"/>
             <a:extLst>
               <a:ext uri="{28A0092B-C50C-407E-A947-70E740481C1C}">
-                <a14:useLocalDpi xmlns:a14="http://schemas.microsoft.com/office/drawing/2010/main" xmlns="" val="0"/>
+                <a14:useLocalDpi xmlns="" xmlns:a14="http://schemas.microsoft.com/office/drawing/2010/main" val="0"/>
               </a:ext>
             </a:extLst>
           </a:blip>
@@ -4060,7 +4060,7 @@
     </p:spTree>
     <p:extLst>
       <p:ext uri="{BB962C8B-B14F-4D97-AF65-F5344CB8AC3E}">
-        <p14:creationId xmlns:p14="http://schemas.microsoft.com/office/powerpoint/2010/main" xmlns="" val="3080300347"/>
+        <p14:creationId xmlns="" xmlns:p14="http://schemas.microsoft.com/office/powerpoint/2010/main" val="3080300347"/>
       </p:ext>
     </p:extLst>
   </p:cSld>
@@ -5209,8 +5209,8 @@
         </p:blipFill>
         <p:spPr>
           <a:xfrm>
-            <a:off x="6300192" y="1844824"/>
-            <a:ext cx="1478280" cy="1973580"/>
+            <a:off x="6372200" y="1844824"/>
+            <a:ext cx="1406272" cy="1877446"/>
           </a:xfrm>
           <a:prstGeom prst="rect">
             <a:avLst/>
@@ -5257,8 +5257,8 @@
         </p:blipFill>
         <p:spPr>
           <a:xfrm>
-            <a:off x="3635896" y="1844824"/>
-            <a:ext cx="1656184" cy="1887024"/>
+            <a:off x="3699094" y="1916832"/>
+            <a:ext cx="1592985" cy="1815016"/>
           </a:xfrm>
           <a:prstGeom prst="rect">
             <a:avLst/>
@@ -5485,8 +5485,39 @@
             </a:pPr>
             <a:r>
               <a:rPr lang="fr-FR" dirty="0" smtClean="0"/>
-              <a:t>Place à la réalisation !</a:t>
-            </a:r>
+              <a:t>Place à la réalisation </a:t>
+            </a:r>
+            <a:r>
+              <a:rPr lang="fr-FR" dirty="0" smtClean="0"/>
+              <a:t>!</a:t>
+            </a:r>
+          </a:p>
+          <a:p>
+            <a:pPr>
+              <a:buFont typeface="Wingdings" pitchFamily="2" charset="2"/>
+              <a:buChar char="q"/>
+            </a:pPr>
+            <a:endParaRPr lang="fr-FR" dirty="0" smtClean="0"/>
+          </a:p>
+          <a:p>
+            <a:pPr>
+              <a:buFont typeface="Wingdings" pitchFamily="2" charset="2"/>
+              <a:buChar char="q"/>
+            </a:pPr>
+            <a:endParaRPr lang="fr-FR" dirty="0" smtClean="0"/>
+          </a:p>
+          <a:p>
+            <a:pPr>
+              <a:buFont typeface="Wingdings" pitchFamily="2" charset="2"/>
+              <a:buChar char="q"/>
+            </a:pPr>
+            <a:endParaRPr lang="fr-FR" dirty="0" smtClean="0"/>
+          </a:p>
+          <a:p>
+            <a:pPr>
+              <a:buFont typeface="Wingdings" pitchFamily="2" charset="2"/>
+              <a:buChar char="q"/>
+            </a:pPr>
             <a:endParaRPr lang="fr-FR" dirty="0"/>
           </a:p>
         </p:txBody>

</xml_diff>

<commit_message>
commit PM 17/12 matin
</commit_message>
<xml_diff>
--- a/soutenances/projet_decembre/planif_et_conclu.pptx
+++ b/soutenances/projet_decembre/planif_et_conclu.pptx
@@ -113,7 +113,7 @@
   </p:defaultTextStyle>
   <p:extLst>
     <p:ext uri="{521415D9-36F7-43E2-AB2F-B90AF26B5E84}">
-      <p14:sectionLst xmlns:p14="http://schemas.microsoft.com/office/powerpoint/2010/main">
+      <p14:sectionLst xmlns="" xmlns:p14="http://schemas.microsoft.com/office/powerpoint/2010/main">
         <p14:section name="Modèles INSA" id="{339B715A-A4F6-482F-9E8F-E995A152AF53}">
           <p14:sldIdLst>
             <p14:sldId id="259"/>
@@ -126,7 +126,7 @@
       </p14:sectionLst>
     </p:ext>
     <p:ext uri="{EFAFB233-063F-42B5-8137-9DF3F51BA10A}">
-      <p15:sldGuideLst xmlns:p15="http://schemas.microsoft.com/office/powerpoint/2012/main">
+      <p15:sldGuideLst xmlns="" xmlns:p15="http://schemas.microsoft.com/office/powerpoint/2012/main">
         <p15:guide id="1" orient="horz" pos="2160">
           <p15:clr>
             <a:srgbClr val="A4A3A4"/>
@@ -225,7 +225,8 @@
           <a:p>
             <a:fld id="{89F65950-4E69-4DEE-8EFE-791968356AE6}" type="datetimeFigureOut">
               <a:rPr lang="fr-FR" smtClean="0"/>
-              <a:t>16/12/2014</a:t>
+              <a:pPr/>
+              <a:t>17/12/2014</a:t>
             </a:fld>
             <a:endParaRPr lang="fr-FR"/>
           </a:p>
@@ -384,6 +385,7 @@
           <a:p>
             <a:fld id="{2600FC35-23D2-447E-B61F-00B8DBEE929E}" type="slidenum">
               <a:rPr lang="fr-FR" smtClean="0"/>
+              <a:pPr/>
               <a:t>‹N°›</a:t>
             </a:fld>
             <a:endParaRPr lang="fr-FR"/>
@@ -393,7 +395,7 @@
     </p:spTree>
     <p:extLst>
       <p:ext uri="{BB962C8B-B14F-4D97-AF65-F5344CB8AC3E}">
-        <p14:creationId xmlns:p14="http://schemas.microsoft.com/office/powerpoint/2010/main" val="4250441103"/>
+        <p14:creationId xmlns="" xmlns:p14="http://schemas.microsoft.com/office/powerpoint/2010/main" val="4250441103"/>
       </p:ext>
     </p:extLst>
   </p:cSld>
@@ -709,6 +711,7 @@
           <a:p>
             <a:fld id="{2600FC35-23D2-447E-B61F-00B8DBEE929E}" type="slidenum">
               <a:rPr lang="fr-FR" smtClean="0"/>
+              <a:pPr/>
               <a:t>2</a:t>
             </a:fld>
             <a:endParaRPr lang="fr-FR"/>
@@ -718,7 +721,7 @@
     </p:spTree>
     <p:extLst>
       <p:ext uri="{BB962C8B-B14F-4D97-AF65-F5344CB8AC3E}">
-        <p14:creationId xmlns:p14="http://schemas.microsoft.com/office/powerpoint/2010/main" val="3881882308"/>
+        <p14:creationId xmlns="" xmlns:p14="http://schemas.microsoft.com/office/powerpoint/2010/main" val="3881882308"/>
       </p:ext>
     </p:extLst>
   </p:cSld>
@@ -875,6 +878,7 @@
           <a:p>
             <a:fld id="{2600FC35-23D2-447E-B61F-00B8DBEE929E}" type="slidenum">
               <a:rPr lang="fr-FR" smtClean="0"/>
+              <a:pPr/>
               <a:t>3</a:t>
             </a:fld>
             <a:endParaRPr lang="fr-FR"/>
@@ -884,7 +888,7 @@
     </p:spTree>
     <p:extLst>
       <p:ext uri="{BB962C8B-B14F-4D97-AF65-F5344CB8AC3E}">
-        <p14:creationId xmlns:p14="http://schemas.microsoft.com/office/powerpoint/2010/main" val="2047181594"/>
+        <p14:creationId xmlns="" xmlns:p14="http://schemas.microsoft.com/office/powerpoint/2010/main" val="2047181594"/>
       </p:ext>
     </p:extLst>
   </p:cSld>
@@ -1055,6 +1059,7 @@
           <a:p>
             <a:fld id="{2600FC35-23D2-447E-B61F-00B8DBEE929E}" type="slidenum">
               <a:rPr lang="fr-FR" smtClean="0"/>
+              <a:pPr/>
               <a:t>4</a:t>
             </a:fld>
             <a:endParaRPr lang="fr-FR"/>
@@ -1064,7 +1069,7 @@
     </p:spTree>
     <p:extLst>
       <p:ext uri="{BB962C8B-B14F-4D97-AF65-F5344CB8AC3E}">
-        <p14:creationId xmlns:p14="http://schemas.microsoft.com/office/powerpoint/2010/main" val="1261299983"/>
+        <p14:creationId xmlns="" xmlns:p14="http://schemas.microsoft.com/office/powerpoint/2010/main" val="1261299983"/>
       </p:ext>
     </p:extLst>
   </p:cSld>
@@ -1163,7 +1168,7 @@
             <a:blip r:embed="rId2" cstate="print">
               <a:extLst>
                 <a:ext uri="{28A0092B-C50C-407E-A947-70E740481C1C}">
-                  <a14:useLocalDpi xmlns:a14="http://schemas.microsoft.com/office/drawing/2010/main" val="0"/>
+                  <a14:useLocalDpi xmlns="" xmlns:a14="http://schemas.microsoft.com/office/drawing/2010/main" val="0"/>
                 </a:ext>
               </a:extLst>
             </a:blip>
@@ -1181,7 +1186,7 @@
             <a:noFill/>
             <a:extLst>
               <a:ext uri="{909E8E84-426E-40DD-AFC4-6F175D3DCCD1}">
-                <a14:hiddenFill xmlns:a14="http://schemas.microsoft.com/office/drawing/2010/main">
+                <a14:hiddenFill xmlns="" xmlns:a14="http://schemas.microsoft.com/office/drawing/2010/main">
                   <a:solidFill>
                     <a:srgbClr val="FFFFFF"/>
                   </a:solidFill>
@@ -1202,7 +1207,7 @@
             <a:blip r:embed="rId3" cstate="print">
               <a:extLst>
                 <a:ext uri="{28A0092B-C50C-407E-A947-70E740481C1C}">
-                  <a14:useLocalDpi xmlns:a14="http://schemas.microsoft.com/office/drawing/2010/main" val="0"/>
+                  <a14:useLocalDpi xmlns="" xmlns:a14="http://schemas.microsoft.com/office/drawing/2010/main" val="0"/>
                 </a:ext>
               </a:extLst>
             </a:blip>
@@ -1222,7 +1227,7 @@
             <a:noFill/>
             <a:extLst>
               <a:ext uri="{909E8E84-426E-40DD-AFC4-6F175D3DCCD1}">
-                <a14:hiddenFill xmlns:a14="http://schemas.microsoft.com/office/drawing/2010/main">
+                <a14:hiddenFill xmlns="" xmlns:a14="http://schemas.microsoft.com/office/drawing/2010/main">
                   <a:solidFill>
                     <a:srgbClr val="FFFFFF"/>
                   </a:solidFill>
@@ -2271,7 +2276,7 @@
     </p:spTree>
     <p:extLst>
       <p:ext uri="{BB962C8B-B14F-4D97-AF65-F5344CB8AC3E}">
-        <p14:creationId xmlns:p14="http://schemas.microsoft.com/office/powerpoint/2010/main" val="2155599893"/>
+        <p14:creationId xmlns="" xmlns:p14="http://schemas.microsoft.com/office/powerpoint/2010/main" val="2155599893"/>
       </p:ext>
     </p:extLst>
   </p:cSld>
@@ -2429,7 +2434,7 @@
     </p:spTree>
     <p:extLst>
       <p:ext uri="{BB962C8B-B14F-4D97-AF65-F5344CB8AC3E}">
-        <p14:creationId xmlns:p14="http://schemas.microsoft.com/office/powerpoint/2010/main" val="2625538701"/>
+        <p14:creationId xmlns="" xmlns:p14="http://schemas.microsoft.com/office/powerpoint/2010/main" val="2625538701"/>
       </p:ext>
     </p:extLst>
   </p:cSld>
@@ -2657,7 +2662,7 @@
     </p:spTree>
     <p:extLst>
       <p:ext uri="{BB962C8B-B14F-4D97-AF65-F5344CB8AC3E}">
-        <p14:creationId xmlns:p14="http://schemas.microsoft.com/office/powerpoint/2010/main" val="1505370761"/>
+        <p14:creationId xmlns="" xmlns:p14="http://schemas.microsoft.com/office/powerpoint/2010/main" val="1505370761"/>
       </p:ext>
     </p:extLst>
   </p:cSld>
@@ -2903,7 +2908,7 @@
     </p:spTree>
     <p:extLst>
       <p:ext uri="{BB962C8B-B14F-4D97-AF65-F5344CB8AC3E}">
-        <p14:creationId xmlns:p14="http://schemas.microsoft.com/office/powerpoint/2010/main" val="1601618539"/>
+        <p14:creationId xmlns="" xmlns:p14="http://schemas.microsoft.com/office/powerpoint/2010/main" val="1601618539"/>
       </p:ext>
     </p:extLst>
   </p:cSld>
@@ -3287,7 +3292,7 @@
     </p:spTree>
     <p:extLst>
       <p:ext uri="{BB962C8B-B14F-4D97-AF65-F5344CB8AC3E}">
-        <p14:creationId xmlns:p14="http://schemas.microsoft.com/office/powerpoint/2010/main" val="171255179"/>
+        <p14:creationId xmlns="" xmlns:p14="http://schemas.microsoft.com/office/powerpoint/2010/main" val="171255179"/>
       </p:ext>
     </p:extLst>
   </p:cSld>
@@ -3389,7 +3394,7 @@
     </p:spTree>
     <p:extLst>
       <p:ext uri="{BB962C8B-B14F-4D97-AF65-F5344CB8AC3E}">
-        <p14:creationId xmlns:p14="http://schemas.microsoft.com/office/powerpoint/2010/main" val="4241946124"/>
+        <p14:creationId xmlns="" xmlns:p14="http://schemas.microsoft.com/office/powerpoint/2010/main" val="4241946124"/>
       </p:ext>
     </p:extLst>
   </p:cSld>
@@ -3427,7 +3432,7 @@
     </p:spTree>
     <p:extLst>
       <p:ext uri="{BB962C8B-B14F-4D97-AF65-F5344CB8AC3E}">
-        <p14:creationId xmlns:p14="http://schemas.microsoft.com/office/powerpoint/2010/main" val="3843733788"/>
+        <p14:creationId xmlns="" xmlns:p14="http://schemas.microsoft.com/office/powerpoint/2010/main" val="3843733788"/>
       </p:ext>
     </p:extLst>
   </p:cSld>
@@ -3723,7 +3728,7 @@
     </p:spTree>
     <p:extLst>
       <p:ext uri="{BB962C8B-B14F-4D97-AF65-F5344CB8AC3E}">
-        <p14:creationId xmlns:p14="http://schemas.microsoft.com/office/powerpoint/2010/main" val="680884878"/>
+        <p14:creationId xmlns="" xmlns:p14="http://schemas.microsoft.com/office/powerpoint/2010/main" val="680884878"/>
       </p:ext>
     </p:extLst>
   </p:cSld>
@@ -4772,7 +4777,7 @@
           <a:blip r:embed="rId10" cstate="print">
             <a:extLst>
               <a:ext uri="{28A0092B-C50C-407E-A947-70E740481C1C}">
-                <a14:useLocalDpi xmlns:a14="http://schemas.microsoft.com/office/drawing/2010/main" val="0"/>
+                <a14:useLocalDpi xmlns="" xmlns:a14="http://schemas.microsoft.com/office/drawing/2010/main" val="0"/>
               </a:ext>
             </a:extLst>
           </a:blip>
@@ -4790,7 +4795,7 @@
           <a:noFill/>
           <a:extLst>
             <a:ext uri="{909E8E84-426E-40DD-AFC4-6F175D3DCCD1}">
-              <a14:hiddenFill xmlns:a14="http://schemas.microsoft.com/office/drawing/2010/main">
+              <a14:hiddenFill xmlns="" xmlns:a14="http://schemas.microsoft.com/office/drawing/2010/main">
                 <a:solidFill>
                   <a:srgbClr val="FFFFFF"/>
                 </a:solidFill>
@@ -4811,7 +4816,7 @@
           <a:blip r:embed="rId11" cstate="print">
             <a:extLst>
               <a:ext uri="{28A0092B-C50C-407E-A947-70E740481C1C}">
-                <a14:useLocalDpi xmlns:a14="http://schemas.microsoft.com/office/drawing/2010/main" val="0"/>
+                <a14:useLocalDpi xmlns="" xmlns:a14="http://schemas.microsoft.com/office/drawing/2010/main" val="0"/>
               </a:ext>
             </a:extLst>
           </a:blip>
@@ -4831,7 +4836,7 @@
           <a:noFill/>
           <a:extLst>
             <a:ext uri="{909E8E84-426E-40DD-AFC4-6F175D3DCCD1}">
-              <a14:hiddenFill xmlns:a14="http://schemas.microsoft.com/office/drawing/2010/main">
+              <a14:hiddenFill xmlns="" xmlns:a14="http://schemas.microsoft.com/office/drawing/2010/main">
                 <a:solidFill>
                   <a:srgbClr val="FFFFFF"/>
                 </a:solidFill>
@@ -4989,7 +4994,7 @@
             <a:lum bright="70000" contrast="-70000"/>
             <a:extLst>
               <a:ext uri="{28A0092B-C50C-407E-A947-70E740481C1C}">
-                <a14:useLocalDpi xmlns:a14="http://schemas.microsoft.com/office/drawing/2010/main" val="0"/>
+                <a14:useLocalDpi xmlns="" xmlns:a14="http://schemas.microsoft.com/office/drawing/2010/main" val="0"/>
               </a:ext>
             </a:extLst>
           </a:blip>
@@ -5010,7 +5015,7 @@
     </p:spTree>
     <p:extLst>
       <p:ext uri="{BB962C8B-B14F-4D97-AF65-F5344CB8AC3E}">
-        <p14:creationId xmlns:p14="http://schemas.microsoft.com/office/powerpoint/2010/main" val="3080300347"/>
+        <p14:creationId xmlns="" xmlns:p14="http://schemas.microsoft.com/office/powerpoint/2010/main" val="3080300347"/>
       </p:ext>
     </p:extLst>
   </p:cSld>
@@ -5554,7 +5559,6 @@
               <a:rPr lang="fr-FR" dirty="0" smtClean="0"/>
               <a:t>Méthode SCRUM</a:t>
             </a:r>
-            <a:endParaRPr lang="fr-FR" dirty="0" smtClean="0"/>
           </a:p>
         </p:txBody>
       </p:sp>
@@ -5592,10 +5596,10 @@
           <p:nvPr/>
         </p:nvPicPr>
         <p:blipFill>
-          <a:blip r:embed="rId3">
+          <a:blip r:embed="rId3" cstate="print">
             <a:extLst>
               <a:ext uri="{28A0092B-C50C-407E-A947-70E740481C1C}">
-                <a14:useLocalDpi xmlns:a14="http://schemas.microsoft.com/office/drawing/2010/main" val="0"/>
+                <a14:useLocalDpi xmlns="" xmlns:a14="http://schemas.microsoft.com/office/drawing/2010/main" val="0"/>
               </a:ext>
             </a:extLst>
           </a:blip>
@@ -5871,8 +5875,17 @@
             </a:pPr>
             <a:r>
               <a:rPr lang="fr-FR" dirty="0" smtClean="0"/>
-              <a:t>Apprentissage de nos erreurs </a:t>
-            </a:r>
+              <a:t>Amélioration au contact des </a:t>
+            </a:r>
+            <a:r>
+              <a:rPr lang="fr-FR" dirty="0" smtClean="0"/>
+              <a:t>difficultés rencontrées</a:t>
+            </a:r>
+            <a:r>
+              <a:rPr lang="fr-FR" dirty="0" smtClean="0"/>
+              <a:t> </a:t>
+            </a:r>
+            <a:endParaRPr lang="fr-FR" dirty="0" smtClean="0"/>
           </a:p>
           <a:p>
             <a:pPr>
@@ -6052,7 +6065,7 @@
     </p:spTree>
     <p:extLst>
       <p:ext uri="{BB962C8B-B14F-4D97-AF65-F5344CB8AC3E}">
-        <p14:creationId xmlns:p14="http://schemas.microsoft.com/office/powerpoint/2010/main" val="2850511356"/>
+        <p14:creationId xmlns="" xmlns:p14="http://schemas.microsoft.com/office/powerpoint/2010/main" val="2850511356"/>
       </p:ext>
     </p:extLst>
   </p:cSld>
@@ -6390,7 +6403,7 @@
     </a:clrScheme>
     <a:fontScheme name="Office">
       <a:majorFont>
-        <a:latin typeface="Calibri Light" panose="020F0302020204030204"/>
+        <a:latin typeface="Calibri Light"/>
         <a:ea typeface=""/>
         <a:cs typeface=""/>
         <a:font script="Jpan" typeface="ＭＳ Ｐゴシック"/>
@@ -6425,7 +6438,7 @@
         <a:font script="Geor" typeface="Sylfaen"/>
       </a:majorFont>
       <a:minorFont>
-        <a:latin typeface="Calibri" panose="020F0502020204030204"/>
+        <a:latin typeface="Calibri"/>
         <a:ea typeface=""/>
         <a:cs typeface=""/>
         <a:font script="Jpan" typeface="ＭＳ Ｐゴシック"/>
@@ -6602,7 +6615,7 @@
   <a:extraClrSchemeLst/>
   <a:extLst>
     <a:ext uri="{05A4C25C-085E-4340-85A3-A5531E510DB2}">
-      <thm15:themeFamily xmlns:thm15="http://schemas.microsoft.com/office/thememl/2012/main" name="Office Theme" id="{62F939B6-93AF-4DB8-9C6B-D6C7DFDC589F}" vid="{4A3C46E8-61CC-4603-A589-7422A47A8E4A}"/>
+      <thm15:themeFamily xmlns="" xmlns:thm15="http://schemas.microsoft.com/office/thememl/2012/main" name="Office Theme" id="{62F939B6-93AF-4DB8-9C6B-D6C7DFDC589F}" vid="{4A3C46E8-61CC-4603-A589-7422A47A8E4A}"/>
     </a:ext>
   </a:extLst>
 </a:theme>

</xml_diff>